<commit_message>
Minor updates to write and run documentation
</commit_message>
<xml_diff>
--- a/doc/HowTo_RunBroadwickExamples_QuickStart.pptx
+++ b/doc/HowTo_RunBroadwickExamples_QuickStart.pptx
@@ -29462,11 +29462,11 @@
           <c:showPercent val="0"/>
           <c:showBubbleSize val="0"/>
         </c:dLbls>
-        <c:axId val="44552128"/>
-        <c:axId val="44552704"/>
+        <c:axId val="85945152"/>
+        <c:axId val="85945728"/>
       </c:scatterChart>
       <c:valAx>
-        <c:axId val="44552128"/>
+        <c:axId val="85945152"/>
         <c:scaling>
           <c:orientation val="minMax"/>
         </c:scaling>
@@ -29495,12 +29495,12 @@
         <c:majorTickMark val="none"/>
         <c:minorTickMark val="none"/>
         <c:tickLblPos val="nextTo"/>
-        <c:crossAx val="44552704"/>
+        <c:crossAx val="85945728"/>
         <c:crosses val="autoZero"/>
         <c:crossBetween val="midCat"/>
       </c:valAx>
       <c:valAx>
-        <c:axId val="44552704"/>
+        <c:axId val="85945728"/>
         <c:scaling>
           <c:orientation val="minMax"/>
         </c:scaling>
@@ -29530,7 +29530,7 @@
         <c:majorTickMark val="none"/>
         <c:minorTickMark val="none"/>
         <c:tickLblPos val="nextTo"/>
-        <c:crossAx val="44552128"/>
+        <c:crossAx val="85945152"/>
         <c:crosses val="autoZero"/>
         <c:crossBetween val="midCat"/>
       </c:valAx>
@@ -29759,7 +29759,7 @@
           <a:p>
             <a:fld id="{91C99948-B705-4EB7-9D0B-50C93C51ECB1}" type="datetimeFigureOut">
               <a:rPr lang="en-GB" smtClean="0"/>
-              <a:t>16/06/2014</a:t>
+              <a:t>18/06/2014</a:t>
             </a:fld>
             <a:endParaRPr lang="en-GB"/>
           </a:p>
@@ -29929,7 +29929,7 @@
           <a:p>
             <a:fld id="{91C99948-B705-4EB7-9D0B-50C93C51ECB1}" type="datetimeFigureOut">
               <a:rPr lang="en-GB" smtClean="0"/>
-              <a:t>16/06/2014</a:t>
+              <a:t>18/06/2014</a:t>
             </a:fld>
             <a:endParaRPr lang="en-GB"/>
           </a:p>
@@ -30109,7 +30109,7 @@
           <a:p>
             <a:fld id="{91C99948-B705-4EB7-9D0B-50C93C51ECB1}" type="datetimeFigureOut">
               <a:rPr lang="en-GB" smtClean="0"/>
-              <a:t>16/06/2014</a:t>
+              <a:t>18/06/2014</a:t>
             </a:fld>
             <a:endParaRPr lang="en-GB"/>
           </a:p>
@@ -30279,7 +30279,7 @@
           <a:p>
             <a:fld id="{91C99948-B705-4EB7-9D0B-50C93C51ECB1}" type="datetimeFigureOut">
               <a:rPr lang="en-GB" smtClean="0"/>
-              <a:t>16/06/2014</a:t>
+              <a:t>18/06/2014</a:t>
             </a:fld>
             <a:endParaRPr lang="en-GB"/>
           </a:p>
@@ -30525,7 +30525,7 @@
           <a:p>
             <a:fld id="{91C99948-B705-4EB7-9D0B-50C93C51ECB1}" type="datetimeFigureOut">
               <a:rPr lang="en-GB" smtClean="0"/>
-              <a:t>16/06/2014</a:t>
+              <a:t>18/06/2014</a:t>
             </a:fld>
             <a:endParaRPr lang="en-GB"/>
           </a:p>
@@ -30813,7 +30813,7 @@
           <a:p>
             <a:fld id="{91C99948-B705-4EB7-9D0B-50C93C51ECB1}" type="datetimeFigureOut">
               <a:rPr lang="en-GB" smtClean="0"/>
-              <a:t>16/06/2014</a:t>
+              <a:t>18/06/2014</a:t>
             </a:fld>
             <a:endParaRPr lang="en-GB"/>
           </a:p>
@@ -31235,7 +31235,7 @@
           <a:p>
             <a:fld id="{91C99948-B705-4EB7-9D0B-50C93C51ECB1}" type="datetimeFigureOut">
               <a:rPr lang="en-GB" smtClean="0"/>
-              <a:t>16/06/2014</a:t>
+              <a:t>18/06/2014</a:t>
             </a:fld>
             <a:endParaRPr lang="en-GB"/>
           </a:p>
@@ -31353,7 +31353,7 @@
           <a:p>
             <a:fld id="{91C99948-B705-4EB7-9D0B-50C93C51ECB1}" type="datetimeFigureOut">
               <a:rPr lang="en-GB" smtClean="0"/>
-              <a:t>16/06/2014</a:t>
+              <a:t>18/06/2014</a:t>
             </a:fld>
             <a:endParaRPr lang="en-GB"/>
           </a:p>
@@ -31448,7 +31448,7 @@
           <a:p>
             <a:fld id="{91C99948-B705-4EB7-9D0B-50C93C51ECB1}" type="datetimeFigureOut">
               <a:rPr lang="en-GB" smtClean="0"/>
-              <a:t>16/06/2014</a:t>
+              <a:t>18/06/2014</a:t>
             </a:fld>
             <a:endParaRPr lang="en-GB"/>
           </a:p>
@@ -31725,7 +31725,7 @@
           <a:p>
             <a:fld id="{91C99948-B705-4EB7-9D0B-50C93C51ECB1}" type="datetimeFigureOut">
               <a:rPr lang="en-GB" smtClean="0"/>
-              <a:t>16/06/2014</a:t>
+              <a:t>18/06/2014</a:t>
             </a:fld>
             <a:endParaRPr lang="en-GB"/>
           </a:p>
@@ -31978,7 +31978,7 @@
           <a:p>
             <a:fld id="{91C99948-B705-4EB7-9D0B-50C93C51ECB1}" type="datetimeFigureOut">
               <a:rPr lang="en-GB" smtClean="0"/>
-              <a:t>16/06/2014</a:t>
+              <a:t>18/06/2014</a:t>
             </a:fld>
             <a:endParaRPr lang="en-GB"/>
           </a:p>
@@ -32191,7 +32191,7 @@
           <a:p>
             <a:fld id="{91C99948-B705-4EB7-9D0B-50C93C51ECB1}" type="datetimeFigureOut">
               <a:rPr lang="en-GB" smtClean="0"/>
-              <a:t>16/06/2014</a:t>
+              <a:t>18/06/2014</a:t>
             </a:fld>
             <a:endParaRPr lang="en-GB"/>
           </a:p>
@@ -32633,6 +32633,66 @@
           </a:p>
         </p:txBody>
       </p:sp>
+      <p:pic>
+        <p:nvPicPr>
+          <p:cNvPr id="5" name="Picture 4"/>
+          <p:cNvPicPr>
+            <a:picLocks noChangeAspect="1"/>
+          </p:cNvPicPr>
+          <p:nvPr/>
+        </p:nvPicPr>
+        <p:blipFill>
+          <a:blip r:embed="rId2" cstate="print">
+            <a:extLst>
+              <a:ext uri="{28A0092B-C50C-407E-A947-70E740481C1C}">
+                <a14:useLocalDpi xmlns:a14="http://schemas.microsoft.com/office/drawing/2010/main" val="0"/>
+              </a:ext>
+            </a:extLst>
+          </a:blip>
+          <a:stretch>
+            <a:fillRect/>
+          </a:stretch>
+        </p:blipFill>
+        <p:spPr>
+          <a:xfrm>
+            <a:off x="6876256" y="5677133"/>
+            <a:ext cx="2053660" cy="920219"/>
+          </a:xfrm>
+          <a:prstGeom prst="rect">
+            <a:avLst/>
+          </a:prstGeom>
+        </p:spPr>
+      </p:pic>
+      <p:pic>
+        <p:nvPicPr>
+          <p:cNvPr id="6" name="Picture 5"/>
+          <p:cNvPicPr>
+            <a:picLocks noChangeAspect="1"/>
+          </p:cNvPicPr>
+          <p:nvPr/>
+        </p:nvPicPr>
+        <p:blipFill>
+          <a:blip r:embed="rId3" cstate="print">
+            <a:extLst>
+              <a:ext uri="{28A0092B-C50C-407E-A947-70E740481C1C}">
+                <a14:useLocalDpi xmlns:a14="http://schemas.microsoft.com/office/drawing/2010/main" val="0"/>
+              </a:ext>
+            </a:extLst>
+          </a:blip>
+          <a:stretch>
+            <a:fillRect/>
+          </a:stretch>
+        </p:blipFill>
+        <p:spPr>
+          <a:xfrm>
+            <a:off x="293215" y="5862285"/>
+            <a:ext cx="5794666" cy="549914"/>
+          </a:xfrm>
+          <a:prstGeom prst="rect">
+            <a:avLst/>
+          </a:prstGeom>
+        </p:spPr>
+      </p:pic>
     </p:spTree>
     <p:extLst>
       <p:ext uri="{BB962C8B-B14F-4D97-AF65-F5344CB8AC3E}">

</xml_diff>

<commit_message>
Update to quick start notes
</commit_message>
<xml_diff>
--- a/doc/HowTo_RunBroadwickExamples_QuickStart.pptx
+++ b/doc/HowTo_RunBroadwickExamples_QuickStart.pptx
@@ -29462,11 +29462,11 @@
           <c:showPercent val="0"/>
           <c:showBubbleSize val="0"/>
         </c:dLbls>
-        <c:axId val="85945152"/>
-        <c:axId val="85945728"/>
+        <c:axId val="88814656"/>
+        <c:axId val="88815232"/>
       </c:scatterChart>
       <c:valAx>
-        <c:axId val="85945152"/>
+        <c:axId val="88814656"/>
         <c:scaling>
           <c:orientation val="minMax"/>
         </c:scaling>
@@ -29495,12 +29495,12 @@
         <c:majorTickMark val="none"/>
         <c:minorTickMark val="none"/>
         <c:tickLblPos val="nextTo"/>
-        <c:crossAx val="85945728"/>
+        <c:crossAx val="88815232"/>
         <c:crosses val="autoZero"/>
         <c:crossBetween val="midCat"/>
       </c:valAx>
       <c:valAx>
-        <c:axId val="85945728"/>
+        <c:axId val="88815232"/>
         <c:scaling>
           <c:orientation val="minMax"/>
         </c:scaling>
@@ -29530,7 +29530,7 @@
         <c:majorTickMark val="none"/>
         <c:minorTickMark val="none"/>
         <c:tickLblPos val="nextTo"/>
-        <c:crossAx val="85945152"/>
+        <c:crossAx val="88814656"/>
         <c:crosses val="autoZero"/>
         <c:crossBetween val="midCat"/>
       </c:valAx>
@@ -29759,7 +29759,7 @@
           <a:p>
             <a:fld id="{91C99948-B705-4EB7-9D0B-50C93C51ECB1}" type="datetimeFigureOut">
               <a:rPr lang="en-GB" smtClean="0"/>
-              <a:t>18/06/2014</a:t>
+              <a:t>19/06/2014</a:t>
             </a:fld>
             <a:endParaRPr lang="en-GB"/>
           </a:p>
@@ -29929,7 +29929,7 @@
           <a:p>
             <a:fld id="{91C99948-B705-4EB7-9D0B-50C93C51ECB1}" type="datetimeFigureOut">
               <a:rPr lang="en-GB" smtClean="0"/>
-              <a:t>18/06/2014</a:t>
+              <a:t>19/06/2014</a:t>
             </a:fld>
             <a:endParaRPr lang="en-GB"/>
           </a:p>
@@ -30109,7 +30109,7 @@
           <a:p>
             <a:fld id="{91C99948-B705-4EB7-9D0B-50C93C51ECB1}" type="datetimeFigureOut">
               <a:rPr lang="en-GB" smtClean="0"/>
-              <a:t>18/06/2014</a:t>
+              <a:t>19/06/2014</a:t>
             </a:fld>
             <a:endParaRPr lang="en-GB"/>
           </a:p>
@@ -30279,7 +30279,7 @@
           <a:p>
             <a:fld id="{91C99948-B705-4EB7-9D0B-50C93C51ECB1}" type="datetimeFigureOut">
               <a:rPr lang="en-GB" smtClean="0"/>
-              <a:t>18/06/2014</a:t>
+              <a:t>19/06/2014</a:t>
             </a:fld>
             <a:endParaRPr lang="en-GB"/>
           </a:p>
@@ -30525,7 +30525,7 @@
           <a:p>
             <a:fld id="{91C99948-B705-4EB7-9D0B-50C93C51ECB1}" type="datetimeFigureOut">
               <a:rPr lang="en-GB" smtClean="0"/>
-              <a:t>18/06/2014</a:t>
+              <a:t>19/06/2014</a:t>
             </a:fld>
             <a:endParaRPr lang="en-GB"/>
           </a:p>
@@ -30813,7 +30813,7 @@
           <a:p>
             <a:fld id="{91C99948-B705-4EB7-9D0B-50C93C51ECB1}" type="datetimeFigureOut">
               <a:rPr lang="en-GB" smtClean="0"/>
-              <a:t>18/06/2014</a:t>
+              <a:t>19/06/2014</a:t>
             </a:fld>
             <a:endParaRPr lang="en-GB"/>
           </a:p>
@@ -31235,7 +31235,7 @@
           <a:p>
             <a:fld id="{91C99948-B705-4EB7-9D0B-50C93C51ECB1}" type="datetimeFigureOut">
               <a:rPr lang="en-GB" smtClean="0"/>
-              <a:t>18/06/2014</a:t>
+              <a:t>19/06/2014</a:t>
             </a:fld>
             <a:endParaRPr lang="en-GB"/>
           </a:p>
@@ -31353,7 +31353,7 @@
           <a:p>
             <a:fld id="{91C99948-B705-4EB7-9D0B-50C93C51ECB1}" type="datetimeFigureOut">
               <a:rPr lang="en-GB" smtClean="0"/>
-              <a:t>18/06/2014</a:t>
+              <a:t>19/06/2014</a:t>
             </a:fld>
             <a:endParaRPr lang="en-GB"/>
           </a:p>
@@ -31448,7 +31448,7 @@
           <a:p>
             <a:fld id="{91C99948-B705-4EB7-9D0B-50C93C51ECB1}" type="datetimeFigureOut">
               <a:rPr lang="en-GB" smtClean="0"/>
-              <a:t>18/06/2014</a:t>
+              <a:t>19/06/2014</a:t>
             </a:fld>
             <a:endParaRPr lang="en-GB"/>
           </a:p>
@@ -31725,7 +31725,7 @@
           <a:p>
             <a:fld id="{91C99948-B705-4EB7-9D0B-50C93C51ECB1}" type="datetimeFigureOut">
               <a:rPr lang="en-GB" smtClean="0"/>
-              <a:t>18/06/2014</a:t>
+              <a:t>19/06/2014</a:t>
             </a:fld>
             <a:endParaRPr lang="en-GB"/>
           </a:p>
@@ -31978,7 +31978,7 @@
           <a:p>
             <a:fld id="{91C99948-B705-4EB7-9D0B-50C93C51ECB1}" type="datetimeFigureOut">
               <a:rPr lang="en-GB" smtClean="0"/>
-              <a:t>18/06/2014</a:t>
+              <a:t>19/06/2014</a:t>
             </a:fld>
             <a:endParaRPr lang="en-GB"/>
           </a:p>
@@ -32191,7 +32191,7 @@
           <a:p>
             <a:fld id="{91C99948-B705-4EB7-9D0B-50C93C51ECB1}" type="datetimeFigureOut">
               <a:rPr lang="en-GB" smtClean="0"/>
-              <a:t>18/06/2014</a:t>
+              <a:t>19/06/2014</a:t>
             </a:fld>
             <a:endParaRPr lang="en-GB"/>
           </a:p>
@@ -32616,18 +32616,39 @@
         </p:nvSpPr>
         <p:spPr/>
         <p:txBody>
-          <a:bodyPr/>
+          <a:bodyPr>
+            <a:normAutofit/>
+          </a:bodyPr>
           <a:lstStyle/>
           <a:p>
             <a:r>
               <a:rPr lang="en-GB" dirty="0" smtClean="0"/>
-              <a:t>S. J. Lycett</a:t>
+              <a:t>S. J. </a:t>
+            </a:r>
+            <a:r>
+              <a:rPr lang="en-GB" dirty="0" smtClean="0"/>
+              <a:t>Lycett</a:t>
             </a:r>
           </a:p>
           <a:p>
             <a:r>
+              <a:rPr lang="en-GB" dirty="0"/>
+              <a:t>Quick Start </a:t>
+            </a:r>
+            <a:r>
               <a:rPr lang="en-GB" dirty="0" smtClean="0"/>
-              <a:t>16 June 2014</a:t>
+              <a:t>Notes</a:t>
+            </a:r>
+            <a:endParaRPr lang="en-GB" dirty="0" smtClean="0"/>
+          </a:p>
+          <a:p>
+            <a:r>
+              <a:rPr lang="en-GB" dirty="0" smtClean="0"/>
+              <a:t>19 </a:t>
+            </a:r>
+            <a:r>
+              <a:rPr lang="en-GB" dirty="0" smtClean="0"/>
+              <a:t>June 2014</a:t>
             </a:r>
             <a:endParaRPr lang="en-GB" dirty="0"/>
           </a:p>

</xml_diff>